<commit_message>
Adicionada referencia ao primeiro slide
</commit_message>
<xml_diff>
--- a/apresentacao tcc.pptx
+++ b/apresentacao tcc.pptx
@@ -215,7 +215,7 @@
             <a:fld id="{2F3EB17E-BC53-FC49-AF5F-F9A8A64D0B14}" type="datetimeFigureOut">
               <a:rPr lang="en-US" smtClean="0"/>
               <a:pPr/>
-              <a:t>11/19/11</a:t>
+              <a:t>11/20/11</a:t>
             </a:fld>
             <a:endParaRPr lang="pt-BR"/>
           </a:p>
@@ -1399,7 +1399,7 @@
             <a:fld id="{13F8C747-ED51-444E-8469-A24B0E223A0E}" type="datetimeFigureOut">
               <a:rPr lang="en-US" smtClean="0"/>
               <a:pPr/>
-              <a:t>11/19/11</a:t>
+              <a:t>11/20/11</a:t>
             </a:fld>
             <a:endParaRPr lang="pt-BR"/>
           </a:p>
@@ -1578,7 +1578,7 @@
             <a:fld id="{13F8C747-ED51-444E-8469-A24B0E223A0E}" type="datetimeFigureOut">
               <a:rPr lang="en-US" smtClean="0"/>
               <a:pPr/>
-              <a:t>11/19/11</a:t>
+              <a:t>11/20/11</a:t>
             </a:fld>
             <a:endParaRPr lang="pt-BR"/>
           </a:p>
@@ -1767,7 +1767,7 @@
             <a:fld id="{13F8C747-ED51-444E-8469-A24B0E223A0E}" type="datetimeFigureOut">
               <a:rPr lang="en-US" smtClean="0"/>
               <a:pPr/>
-              <a:t>11/19/11</a:t>
+              <a:t>11/20/11</a:t>
             </a:fld>
             <a:endParaRPr lang="pt-BR"/>
           </a:p>
@@ -2056,7 +2056,7 @@
             <a:fld id="{13F8C747-ED51-444E-8469-A24B0E223A0E}" type="datetimeFigureOut">
               <a:rPr lang="en-US" smtClean="0"/>
               <a:pPr/>
-              <a:t>11/19/11</a:t>
+              <a:t>11/20/11</a:t>
             </a:fld>
             <a:endParaRPr lang="pt-BR"/>
           </a:p>
@@ -2235,7 +2235,7 @@
             <a:fld id="{13F8C747-ED51-444E-8469-A24B0E223A0E}" type="datetimeFigureOut">
               <a:rPr lang="en-US" smtClean="0"/>
               <a:pPr/>
-              <a:t>11/19/11</a:t>
+              <a:t>11/20/11</a:t>
             </a:fld>
             <a:endParaRPr lang="pt-BR"/>
           </a:p>
@@ -2490,7 +2490,7 @@
             <a:fld id="{13F8C747-ED51-444E-8469-A24B0E223A0E}" type="datetimeFigureOut">
               <a:rPr lang="en-US" smtClean="0"/>
               <a:pPr/>
-              <a:t>11/19/11</a:t>
+              <a:t>11/20/11</a:t>
             </a:fld>
             <a:endParaRPr lang="pt-BR"/>
           </a:p>
@@ -2787,7 +2787,7 @@
             <a:fld id="{13F8C747-ED51-444E-8469-A24B0E223A0E}" type="datetimeFigureOut">
               <a:rPr lang="en-US" smtClean="0"/>
               <a:pPr/>
-              <a:t>11/19/11</a:t>
+              <a:t>11/20/11</a:t>
             </a:fld>
             <a:endParaRPr lang="pt-BR"/>
           </a:p>
@@ -3218,7 +3218,7 @@
             <a:fld id="{13F8C747-ED51-444E-8469-A24B0E223A0E}" type="datetimeFigureOut">
               <a:rPr lang="en-US" smtClean="0"/>
               <a:pPr/>
-              <a:t>11/19/11</a:t>
+              <a:t>11/20/11</a:t>
             </a:fld>
             <a:endParaRPr lang="pt-BR"/>
           </a:p>
@@ -3345,7 +3345,7 @@
             <a:fld id="{13F8C747-ED51-444E-8469-A24B0E223A0E}" type="datetimeFigureOut">
               <a:rPr lang="en-US" smtClean="0"/>
               <a:pPr/>
-              <a:t>11/19/11</a:t>
+              <a:t>11/20/11</a:t>
             </a:fld>
             <a:endParaRPr lang="pt-BR"/>
           </a:p>
@@ -3449,7 +3449,7 @@
             <a:fld id="{13F8C747-ED51-444E-8469-A24B0E223A0E}" type="datetimeFigureOut">
               <a:rPr lang="en-US" smtClean="0"/>
               <a:pPr/>
-              <a:t>11/19/11</a:t>
+              <a:t>11/20/11</a:t>
             </a:fld>
             <a:endParaRPr lang="pt-BR"/>
           </a:p>
@@ -3735,7 +3735,7 @@
             <a:fld id="{13F8C747-ED51-444E-8469-A24B0E223A0E}" type="datetimeFigureOut">
               <a:rPr lang="en-US" smtClean="0"/>
               <a:pPr/>
-              <a:t>11/19/11</a:t>
+              <a:t>11/20/11</a:t>
             </a:fld>
             <a:endParaRPr lang="pt-BR"/>
           </a:p>
@@ -3914,7 +3914,7 @@
             <a:fld id="{13F8C747-ED51-444E-8469-A24B0E223A0E}" type="datetimeFigureOut">
               <a:rPr lang="en-US" smtClean="0"/>
               <a:pPr/>
-              <a:t>11/19/11</a:t>
+              <a:t>11/20/11</a:t>
             </a:fld>
             <a:endParaRPr lang="pt-BR"/>
           </a:p>
@@ -4182,7 +4182,7 @@
             <a:fld id="{13F8C747-ED51-444E-8469-A24B0E223A0E}" type="datetimeFigureOut">
               <a:rPr lang="en-US" smtClean="0"/>
               <a:pPr/>
-              <a:t>11/19/11</a:t>
+              <a:t>11/20/11</a:t>
             </a:fld>
             <a:endParaRPr lang="pt-BR"/>
           </a:p>
@@ -4361,7 +4361,7 @@
             <a:fld id="{13F8C747-ED51-444E-8469-A24B0E223A0E}" type="datetimeFigureOut">
               <a:rPr lang="en-US" smtClean="0"/>
               <a:pPr/>
-              <a:t>11/19/11</a:t>
+              <a:t>11/20/11</a:t>
             </a:fld>
             <a:endParaRPr lang="pt-BR"/>
           </a:p>
@@ -4550,7 +4550,7 @@
             <a:fld id="{13F8C747-ED51-444E-8469-A24B0E223A0E}" type="datetimeFigureOut">
               <a:rPr lang="en-US" smtClean="0"/>
               <a:pPr/>
-              <a:t>11/19/11</a:t>
+              <a:t>11/20/11</a:t>
             </a:fld>
             <a:endParaRPr lang="pt-BR"/>
           </a:p>
@@ -4805,7 +4805,7 @@
             <a:fld id="{13F8C747-ED51-444E-8469-A24B0E223A0E}" type="datetimeFigureOut">
               <a:rPr lang="en-US" smtClean="0"/>
               <a:pPr/>
-              <a:t>11/19/11</a:t>
+              <a:t>11/20/11</a:t>
             </a:fld>
             <a:endParaRPr lang="pt-BR"/>
           </a:p>
@@ -5102,7 +5102,7 @@
             <a:fld id="{13F8C747-ED51-444E-8469-A24B0E223A0E}" type="datetimeFigureOut">
               <a:rPr lang="en-US" smtClean="0"/>
               <a:pPr/>
-              <a:t>11/19/11</a:t>
+              <a:t>11/20/11</a:t>
             </a:fld>
             <a:endParaRPr lang="pt-BR"/>
           </a:p>
@@ -5533,7 +5533,7 @@
             <a:fld id="{13F8C747-ED51-444E-8469-A24B0E223A0E}" type="datetimeFigureOut">
               <a:rPr lang="en-US" smtClean="0"/>
               <a:pPr/>
-              <a:t>11/19/11</a:t>
+              <a:t>11/20/11</a:t>
             </a:fld>
             <a:endParaRPr lang="pt-BR"/>
           </a:p>
@@ -5660,7 +5660,7 @@
             <a:fld id="{13F8C747-ED51-444E-8469-A24B0E223A0E}" type="datetimeFigureOut">
               <a:rPr lang="en-US" smtClean="0"/>
               <a:pPr/>
-              <a:t>11/19/11</a:t>
+              <a:t>11/20/11</a:t>
             </a:fld>
             <a:endParaRPr lang="pt-BR"/>
           </a:p>
@@ -5764,7 +5764,7 @@
             <a:fld id="{13F8C747-ED51-444E-8469-A24B0E223A0E}" type="datetimeFigureOut">
               <a:rPr lang="en-US" smtClean="0"/>
               <a:pPr/>
-              <a:t>11/19/11</a:t>
+              <a:t>11/20/11</a:t>
             </a:fld>
             <a:endParaRPr lang="pt-BR"/>
           </a:p>
@@ -6050,7 +6050,7 @@
             <a:fld id="{13F8C747-ED51-444E-8469-A24B0E223A0E}" type="datetimeFigureOut">
               <a:rPr lang="en-US" smtClean="0"/>
               <a:pPr/>
-              <a:t>11/19/11</a:t>
+              <a:t>11/20/11</a:t>
             </a:fld>
             <a:endParaRPr lang="pt-BR"/>
           </a:p>
@@ -6318,7 +6318,7 @@
             <a:fld id="{13F8C747-ED51-444E-8469-A24B0E223A0E}" type="datetimeFigureOut">
               <a:rPr lang="en-US" smtClean="0"/>
               <a:pPr/>
-              <a:t>11/19/11</a:t>
+              <a:t>11/20/11</a:t>
             </a:fld>
             <a:endParaRPr lang="pt-BR"/>
           </a:p>
@@ -6592,7 +6592,7 @@
             <a:fld id="{13F8C747-ED51-444E-8469-A24B0E223A0E}" type="datetimeFigureOut">
               <a:rPr lang="en-US" smtClean="0"/>
               <a:pPr/>
-              <a:t>11/19/11</a:t>
+              <a:t>11/20/11</a:t>
             </a:fld>
             <a:endParaRPr lang="pt-BR"/>
           </a:p>
@@ -7298,7 +7298,7 @@
             <a:fld id="{13F8C747-ED51-444E-8469-A24B0E223A0E}" type="datetimeFigureOut">
               <a:rPr lang="en-US" smtClean="0"/>
               <a:pPr/>
-              <a:t>11/19/11</a:t>
+              <a:t>11/20/11</a:t>
             </a:fld>
             <a:endParaRPr lang="pt-BR"/>
           </a:p>
@@ -9279,14 +9279,24 @@
           <a:p>
             <a:r>
               <a:rPr lang="pt-BR" sz="2800" dirty="0" smtClean="0"/>
-              <a:t>Movimentou cerca de 1,23 trilhões de dólares em 2008.</a:t>
-            </a:r>
-          </a:p>
-          <a:p>
+              <a:t>Movimentou cerca de 1,23 trilhões de dólares em </a:t>
+            </a:r>
             <a:r>
               <a:rPr lang="pt-BR" sz="2800" dirty="0" smtClean="0"/>
-              <a:t>Possui um crescimento de 3% ao ano.</a:t>
-            </a:r>
+              <a:t>2008 (SUCESU-RS, 2011).</a:t>
+            </a:r>
+            <a:endParaRPr lang="pt-BR" sz="2800" dirty="0" smtClean="0"/>
+          </a:p>
+          <a:p>
+            <a:r>
+              <a:rPr lang="pt-BR" sz="2800" dirty="0" smtClean="0"/>
+              <a:t>Possui um crescimento de 3% ao </a:t>
+            </a:r>
+            <a:r>
+              <a:rPr lang="pt-BR" sz="2800" dirty="0" smtClean="0"/>
+              <a:t>ano.</a:t>
+            </a:r>
+            <a:endParaRPr lang="pt-BR" sz="2800" dirty="0" smtClean="0"/>
           </a:p>
           <a:p>
             <a:r>

</xml_diff>

<commit_message>
Correcoes na apresentacao e inclusao do texto que deve ser falado
</commit_message>
<xml_diff>
--- a/apresentacao tcc.pptx
+++ b/apresentacao tcc.pptx
@@ -19,14 +19,14 @@
     <p:sldId id="267" r:id="rId10"/>
     <p:sldId id="262" r:id="rId11"/>
     <p:sldId id="270" r:id="rId12"/>
-    <p:sldId id="263" r:id="rId13"/>
-    <p:sldId id="277" r:id="rId14"/>
+    <p:sldId id="277" r:id="rId13"/>
+    <p:sldId id="263" r:id="rId14"/>
     <p:sldId id="268" r:id="rId15"/>
     <p:sldId id="269" r:id="rId16"/>
     <p:sldId id="264" r:id="rId17"/>
     <p:sldId id="271" r:id="rId18"/>
-    <p:sldId id="279" r:id="rId19"/>
-    <p:sldId id="272" r:id="rId20"/>
+    <p:sldId id="272" r:id="rId19"/>
+    <p:sldId id="279" r:id="rId20"/>
     <p:sldId id="273" r:id="rId21"/>
     <p:sldId id="274" r:id="rId22"/>
     <p:sldId id="275" r:id="rId23"/>
@@ -7985,151 +7985,6 @@
       </p:grpSpPr>
       <p:sp>
         <p:nvSpPr>
-          <p:cNvPr id="2" name="Title 1"/>
-          <p:cNvSpPr>
-            <a:spLocks noGrp="1"/>
-          </p:cNvSpPr>
-          <p:nvPr>
-            <p:ph type="title"/>
-          </p:nvPr>
-        </p:nvSpPr>
-        <p:spPr>
-          <a:xfrm>
-            <a:off x="457200" y="858838"/>
-            <a:ext cx="8229600" cy="1143000"/>
-          </a:xfrm>
-        </p:spPr>
-        <p:txBody>
-          <a:bodyPr/>
-          <a:lstStyle/>
-          <a:p>
-            <a:r>
-              <a:rPr lang="pt-BR" dirty="0" smtClean="0"/>
-              <a:t>Sistema Web</a:t>
-            </a:r>
-            <a:endParaRPr lang="pt-BR" dirty="0"/>
-          </a:p>
-        </p:txBody>
-      </p:sp>
-      <p:sp>
-        <p:nvSpPr>
-          <p:cNvPr id="3" name="Content Placeholder 2"/>
-          <p:cNvSpPr>
-            <a:spLocks noGrp="1"/>
-          </p:cNvSpPr>
-          <p:nvPr>
-            <p:ph idx="1"/>
-          </p:nvPr>
-        </p:nvSpPr>
-        <p:spPr>
-          <a:xfrm>
-            <a:off x="457200" y="2590801"/>
-            <a:ext cx="8229600" cy="2806700"/>
-          </a:xfrm>
-        </p:spPr>
-        <p:txBody>
-          <a:bodyPr/>
-          <a:lstStyle/>
-          <a:p>
-            <a:r>
-              <a:rPr lang="pt-BR" dirty="0" smtClean="0"/>
-              <a:t>Desenvolvido utilizando </a:t>
-            </a:r>
-            <a:r>
-              <a:rPr lang="pt-BR" dirty="0" err="1" smtClean="0"/>
-              <a:t>Ruby</a:t>
-            </a:r>
-            <a:r>
-              <a:rPr lang="pt-BR" dirty="0" smtClean="0"/>
-              <a:t> </a:t>
-            </a:r>
-            <a:r>
-              <a:rPr lang="pt-BR" dirty="0" err="1" smtClean="0"/>
-              <a:t>On</a:t>
-            </a:r>
-            <a:r>
-              <a:rPr lang="pt-BR" dirty="0" smtClean="0"/>
-              <a:t> </a:t>
-            </a:r>
-            <a:r>
-              <a:rPr lang="pt-BR" dirty="0" err="1" smtClean="0"/>
-              <a:t>Rails</a:t>
-            </a:r>
-            <a:r>
-              <a:rPr lang="pt-BR" dirty="0" smtClean="0"/>
-              <a:t>.</a:t>
-            </a:r>
-          </a:p>
-          <a:p>
-            <a:r>
-              <a:rPr lang="pt-BR" dirty="0" smtClean="0"/>
-              <a:t>Foram criados testes de unidade e de integração.</a:t>
-            </a:r>
-          </a:p>
-          <a:p>
-            <a:r>
-              <a:rPr lang="pt-BR" dirty="0" smtClean="0"/>
-              <a:t>Os testes foram criados utilizando </a:t>
-            </a:r>
-            <a:r>
-              <a:rPr lang="pt-BR" dirty="0" err="1" smtClean="0"/>
-              <a:t>R</a:t>
-            </a:r>
-            <a:r>
-              <a:rPr lang="en-US" dirty="0"/>
-              <a:t>S</a:t>
-            </a:r>
-            <a:r>
-              <a:rPr lang="pt-BR" dirty="0" smtClean="0"/>
-              <a:t>pec.</a:t>
-            </a:r>
-          </a:p>
-        </p:txBody>
-      </p:sp>
-    </p:spTree>
-    <p:extLst>
-      <p:ext uri="{BB962C8B-B14F-4D97-AF65-F5344CB8AC3E}">
-        <p14:creationId xmlns:p14="http://schemas.microsoft.com/office/powerpoint/2010/main" val="1418869883"/>
-      </p:ext>
-    </p:extLst>
-  </p:cSld>
-  <p:clrMapOvr>
-    <a:overrideClrMapping bg1="lt1" tx1="dk1" bg2="lt2" tx2="dk2" accent1="accent1" accent2="accent2" accent3="accent3" accent4="accent4" accent5="accent5" accent6="accent6" hlink="hlink" folHlink="folHlink"/>
-  </p:clrMapOvr>
-  <p:timing>
-    <p:tnLst>
-      <p:par>
-        <p:cTn xmlns:p14="http://schemas.microsoft.com/office/powerpoint/2010/main" id="1" dur="indefinite" restart="never" nodeType="tmRoot"/>
-      </p:par>
-    </p:tnLst>
-  </p:timing>
-</p:sld>
-</file>
-
-<file path=ppt/slides/slide12.xml><?xml version="1.0" encoding="utf-8"?>
-<p:sld xmlns:a="http://schemas.openxmlformats.org/drawingml/2006/main" xmlns:r="http://schemas.openxmlformats.org/officeDocument/2006/relationships" xmlns:p="http://schemas.openxmlformats.org/presentationml/2006/main">
-  <p:cSld>
-    <p:bg>
-      <p:bgRef idx="1001">
-        <a:schemeClr val="bg1"/>
-      </p:bgRef>
-    </p:bg>
-    <p:spTree>
-      <p:nvGrpSpPr>
-        <p:cNvPr id="1" name=""/>
-        <p:cNvGrpSpPr/>
-        <p:nvPr/>
-      </p:nvGrpSpPr>
-      <p:grpSpPr>
-        <a:xfrm>
-          <a:off x="0" y="0"/>
-          <a:ext cx="0" cy="0"/>
-          <a:chOff x="0" y="0"/>
-          <a:chExt cx="0" cy="0"/>
-        </a:xfrm>
-      </p:grpSpPr>
-      <p:sp>
-        <p:nvSpPr>
           <p:cNvPr id="2" name="Título 1"/>
           <p:cNvSpPr>
             <a:spLocks noGrp="1"/>
@@ -8437,6 +8292,151 @@
 </p:sld>
 </file>
 
+<file path=ppt/slides/slide12.xml><?xml version="1.0" encoding="utf-8"?>
+<p:sld xmlns:a="http://schemas.openxmlformats.org/drawingml/2006/main" xmlns:r="http://schemas.openxmlformats.org/officeDocument/2006/relationships" xmlns:p="http://schemas.openxmlformats.org/presentationml/2006/main">
+  <p:cSld>
+    <p:bg>
+      <p:bgRef idx="1001">
+        <a:schemeClr val="bg1"/>
+      </p:bgRef>
+    </p:bg>
+    <p:spTree>
+      <p:nvGrpSpPr>
+        <p:cNvPr id="1" name=""/>
+        <p:cNvGrpSpPr/>
+        <p:nvPr/>
+      </p:nvGrpSpPr>
+      <p:grpSpPr>
+        <a:xfrm>
+          <a:off x="0" y="0"/>
+          <a:ext cx="0" cy="0"/>
+          <a:chOff x="0" y="0"/>
+          <a:chExt cx="0" cy="0"/>
+        </a:xfrm>
+      </p:grpSpPr>
+      <p:sp>
+        <p:nvSpPr>
+          <p:cNvPr id="2" name="Title 1"/>
+          <p:cNvSpPr>
+            <a:spLocks noGrp="1"/>
+          </p:cNvSpPr>
+          <p:nvPr>
+            <p:ph type="title"/>
+          </p:nvPr>
+        </p:nvSpPr>
+        <p:spPr>
+          <a:xfrm>
+            <a:off x="457200" y="858838"/>
+            <a:ext cx="8229600" cy="1143000"/>
+          </a:xfrm>
+        </p:spPr>
+        <p:txBody>
+          <a:bodyPr/>
+          <a:lstStyle/>
+          <a:p>
+            <a:r>
+              <a:rPr lang="pt-BR" dirty="0" smtClean="0"/>
+              <a:t>Sistema Web</a:t>
+            </a:r>
+            <a:endParaRPr lang="pt-BR" dirty="0"/>
+          </a:p>
+        </p:txBody>
+      </p:sp>
+      <p:sp>
+        <p:nvSpPr>
+          <p:cNvPr id="3" name="Content Placeholder 2"/>
+          <p:cNvSpPr>
+            <a:spLocks noGrp="1"/>
+          </p:cNvSpPr>
+          <p:nvPr>
+            <p:ph idx="1"/>
+          </p:nvPr>
+        </p:nvSpPr>
+        <p:spPr>
+          <a:xfrm>
+            <a:off x="457200" y="2590801"/>
+            <a:ext cx="8229600" cy="2806700"/>
+          </a:xfrm>
+        </p:spPr>
+        <p:txBody>
+          <a:bodyPr/>
+          <a:lstStyle/>
+          <a:p>
+            <a:r>
+              <a:rPr lang="pt-BR" dirty="0" smtClean="0"/>
+              <a:t>Desenvolvido utilizando </a:t>
+            </a:r>
+            <a:r>
+              <a:rPr lang="pt-BR" dirty="0" err="1" smtClean="0"/>
+              <a:t>Ruby</a:t>
+            </a:r>
+            <a:r>
+              <a:rPr lang="pt-BR" dirty="0" smtClean="0"/>
+              <a:t> </a:t>
+            </a:r>
+            <a:r>
+              <a:rPr lang="pt-BR" dirty="0" err="1" smtClean="0"/>
+              <a:t>On</a:t>
+            </a:r>
+            <a:r>
+              <a:rPr lang="pt-BR" dirty="0" smtClean="0"/>
+              <a:t> </a:t>
+            </a:r>
+            <a:r>
+              <a:rPr lang="pt-BR" dirty="0" err="1" smtClean="0"/>
+              <a:t>Rails</a:t>
+            </a:r>
+            <a:r>
+              <a:rPr lang="pt-BR" dirty="0" smtClean="0"/>
+              <a:t>.</a:t>
+            </a:r>
+          </a:p>
+          <a:p>
+            <a:r>
+              <a:rPr lang="pt-BR" dirty="0" smtClean="0"/>
+              <a:t>Foram criados testes de unidade e de integração.</a:t>
+            </a:r>
+          </a:p>
+          <a:p>
+            <a:r>
+              <a:rPr lang="pt-BR" dirty="0" smtClean="0"/>
+              <a:t>Os testes foram criados utilizando </a:t>
+            </a:r>
+            <a:r>
+              <a:rPr lang="pt-BR" dirty="0" err="1" smtClean="0"/>
+              <a:t>R</a:t>
+            </a:r>
+            <a:r>
+              <a:rPr lang="en-US" dirty="0"/>
+              <a:t>S</a:t>
+            </a:r>
+            <a:r>
+              <a:rPr lang="pt-BR" dirty="0" smtClean="0"/>
+              <a:t>pec.</a:t>
+            </a:r>
+          </a:p>
+        </p:txBody>
+      </p:sp>
+    </p:spTree>
+    <p:extLst>
+      <p:ext uri="{BB962C8B-B14F-4D97-AF65-F5344CB8AC3E}">
+        <p14:creationId xmlns:p14="http://schemas.microsoft.com/office/powerpoint/2010/main" val="1418869883"/>
+      </p:ext>
+    </p:extLst>
+  </p:cSld>
+  <p:clrMapOvr>
+    <a:overrideClrMapping bg1="lt1" tx1="dk1" bg2="lt2" tx2="dk2" accent1="accent1" accent2="accent2" accent3="accent3" accent4="accent4" accent5="accent5" accent6="accent6" hlink="hlink" folHlink="folHlink"/>
+  </p:clrMapOvr>
+  <p:timing>
+    <p:tnLst>
+      <p:par>
+        <p:cTn xmlns:p14="http://schemas.microsoft.com/office/powerpoint/2010/main" id="1" dur="indefinite" restart="never" nodeType="tmRoot"/>
+      </p:par>
+    </p:tnLst>
+  </p:timing>
+</p:sld>
+</file>
+
 <file path=ppt/slides/slide13.xml><?xml version="1.0" encoding="utf-8"?>
 <p:sld xmlns:a="http://schemas.openxmlformats.org/drawingml/2006/main" xmlns:r="http://schemas.openxmlformats.org/officeDocument/2006/relationships" xmlns:p="http://schemas.openxmlformats.org/presentationml/2006/main">
   <p:cSld>
@@ -8781,7 +8781,7 @@
         </p:nvSpPr>
         <p:spPr>
           <a:xfrm>
-            <a:off x="457200" y="2540001"/>
+            <a:off x="457200" y="2552576"/>
             <a:ext cx="8229600" cy="2540000"/>
           </a:xfrm>
         </p:spPr>
@@ -8838,6 +8838,100 @@
 </file>
 
 <file path=ppt/slides/slide17.xml><?xml version="1.0" encoding="utf-8"?>
+<p:sld xmlns:a="http://schemas.openxmlformats.org/drawingml/2006/main" xmlns:r="http://schemas.openxmlformats.org/officeDocument/2006/relationships" xmlns:p="http://schemas.openxmlformats.org/presentationml/2006/main">
+  <p:cSld>
+    <p:bg>
+      <p:bgRef idx="1001">
+        <a:schemeClr val="bg1"/>
+      </p:bgRef>
+    </p:bg>
+    <p:spTree>
+      <p:nvGrpSpPr>
+        <p:cNvPr id="1" name=""/>
+        <p:cNvGrpSpPr/>
+        <p:nvPr/>
+      </p:nvGrpSpPr>
+      <p:grpSpPr>
+        <a:xfrm>
+          <a:off x="0" y="0"/>
+          <a:ext cx="0" cy="0"/>
+          <a:chOff x="0" y="0"/>
+          <a:chExt cx="0" cy="0"/>
+        </a:xfrm>
+      </p:grpSpPr>
+      <p:sp>
+        <p:nvSpPr>
+          <p:cNvPr id="2" name="Title 1"/>
+          <p:cNvSpPr>
+            <a:spLocks noGrp="1"/>
+          </p:cNvSpPr>
+          <p:nvPr>
+            <p:ph type="title"/>
+          </p:nvPr>
+        </p:nvSpPr>
+        <p:spPr>
+          <a:xfrm>
+            <a:off x="457200" y="846138"/>
+            <a:ext cx="8229600" cy="1143000"/>
+          </a:xfrm>
+        </p:spPr>
+        <p:txBody>
+          <a:bodyPr/>
+          <a:lstStyle/>
+          <a:p>
+            <a:r>
+              <a:rPr lang="pt-BR" dirty="0" smtClean="0"/>
+              <a:t>Exemplo de código de teste</a:t>
+            </a:r>
+            <a:endParaRPr lang="pt-BR" dirty="0"/>
+          </a:p>
+        </p:txBody>
+      </p:sp>
+      <p:pic>
+        <p:nvPicPr>
+          <p:cNvPr id="4" name="Picture 3"/>
+          <p:cNvPicPr>
+            <a:picLocks noChangeAspect="1"/>
+          </p:cNvPicPr>
+          <p:nvPr/>
+        </p:nvPicPr>
+        <p:blipFill>
+          <a:blip r:embed="rId3"/>
+          <a:stretch>
+            <a:fillRect/>
+          </a:stretch>
+        </p:blipFill>
+        <p:spPr>
+          <a:xfrm>
+            <a:off x="1643743" y="2141538"/>
+            <a:ext cx="5747657" cy="3920587"/>
+          </a:xfrm>
+          <a:prstGeom prst="rect">
+            <a:avLst/>
+          </a:prstGeom>
+        </p:spPr>
+      </p:pic>
+    </p:spTree>
+    <p:extLst>
+      <p:ext uri="{BB962C8B-B14F-4D97-AF65-F5344CB8AC3E}">
+        <p14:creationId xmlns:p14="http://schemas.microsoft.com/office/powerpoint/2010/main" val="2130068562"/>
+      </p:ext>
+    </p:extLst>
+  </p:cSld>
+  <p:clrMapOvr>
+    <a:overrideClrMapping bg1="lt1" tx1="dk1" bg2="lt2" tx2="dk2" accent1="accent1" accent2="accent2" accent3="accent3" accent4="accent4" accent5="accent5" accent6="accent6" hlink="hlink" folHlink="folHlink"/>
+  </p:clrMapOvr>
+  <p:timing>
+    <p:tnLst>
+      <p:par>
+        <p:cTn xmlns:p14="http://schemas.microsoft.com/office/powerpoint/2010/main" id="1" dur="indefinite" restart="never" nodeType="tmRoot"/>
+      </p:par>
+    </p:tnLst>
+  </p:timing>
+</p:sld>
+</file>
+
+<file path=ppt/slides/slide18.xml><?xml version="1.0" encoding="utf-8"?>
 <p:sld xmlns:a="http://schemas.openxmlformats.org/drawingml/2006/main" xmlns:r="http://schemas.openxmlformats.org/officeDocument/2006/relationships" xmlns:p="http://schemas.openxmlformats.org/presentationml/2006/main">
   <p:cSld>
     <p:bg>
@@ -8931,100 +9025,6 @@
 </p:sld>
 </file>
 
-<file path=ppt/slides/slide18.xml><?xml version="1.0" encoding="utf-8"?>
-<p:sld xmlns:a="http://schemas.openxmlformats.org/drawingml/2006/main" xmlns:r="http://schemas.openxmlformats.org/officeDocument/2006/relationships" xmlns:p="http://schemas.openxmlformats.org/presentationml/2006/main">
-  <p:cSld>
-    <p:bg>
-      <p:bgRef idx="1001">
-        <a:schemeClr val="bg1"/>
-      </p:bgRef>
-    </p:bg>
-    <p:spTree>
-      <p:nvGrpSpPr>
-        <p:cNvPr id="1" name=""/>
-        <p:cNvGrpSpPr/>
-        <p:nvPr/>
-      </p:nvGrpSpPr>
-      <p:grpSpPr>
-        <a:xfrm>
-          <a:off x="0" y="0"/>
-          <a:ext cx="0" cy="0"/>
-          <a:chOff x="0" y="0"/>
-          <a:chExt cx="0" cy="0"/>
-        </a:xfrm>
-      </p:grpSpPr>
-      <p:sp>
-        <p:nvSpPr>
-          <p:cNvPr id="2" name="Title 1"/>
-          <p:cNvSpPr>
-            <a:spLocks noGrp="1"/>
-          </p:cNvSpPr>
-          <p:nvPr>
-            <p:ph type="title"/>
-          </p:nvPr>
-        </p:nvSpPr>
-        <p:spPr>
-          <a:xfrm>
-            <a:off x="457200" y="846138"/>
-            <a:ext cx="8229600" cy="1143000"/>
-          </a:xfrm>
-        </p:spPr>
-        <p:txBody>
-          <a:bodyPr/>
-          <a:lstStyle/>
-          <a:p>
-            <a:r>
-              <a:rPr lang="pt-BR" dirty="0" smtClean="0"/>
-              <a:t>Exemplo de código de teste</a:t>
-            </a:r>
-            <a:endParaRPr lang="pt-BR" dirty="0"/>
-          </a:p>
-        </p:txBody>
-      </p:sp>
-      <p:pic>
-        <p:nvPicPr>
-          <p:cNvPr id="4" name="Picture 3"/>
-          <p:cNvPicPr>
-            <a:picLocks noChangeAspect="1"/>
-          </p:cNvPicPr>
-          <p:nvPr/>
-        </p:nvPicPr>
-        <p:blipFill>
-          <a:blip r:embed="rId3"/>
-          <a:stretch>
-            <a:fillRect/>
-          </a:stretch>
-        </p:blipFill>
-        <p:spPr>
-          <a:xfrm>
-            <a:off x="1643743" y="2141538"/>
-            <a:ext cx="5747657" cy="3920587"/>
-          </a:xfrm>
-          <a:prstGeom prst="rect">
-            <a:avLst/>
-          </a:prstGeom>
-        </p:spPr>
-      </p:pic>
-    </p:spTree>
-    <p:extLst>
-      <p:ext uri="{BB962C8B-B14F-4D97-AF65-F5344CB8AC3E}">
-        <p14:creationId xmlns:p14="http://schemas.microsoft.com/office/powerpoint/2010/main" val="2130068562"/>
-      </p:ext>
-    </p:extLst>
-  </p:cSld>
-  <p:clrMapOvr>
-    <a:overrideClrMapping bg1="lt1" tx1="dk1" bg2="lt2" tx2="dk2" accent1="accent1" accent2="accent2" accent3="accent3" accent4="accent4" accent5="accent5" accent6="accent6" hlink="hlink" folHlink="folHlink"/>
-  </p:clrMapOvr>
-  <p:timing>
-    <p:tnLst>
-      <p:par>
-        <p:cTn xmlns:p14="http://schemas.microsoft.com/office/powerpoint/2010/main" id="1" dur="indefinite" restart="never" nodeType="tmRoot"/>
-      </p:par>
-    </p:tnLst>
-  </p:timing>
-</p:sld>
-</file>
-
 <file path=ppt/slides/slide19.xml><?xml version="1.0" encoding="utf-8"?>
 <p:sld xmlns:a="http://schemas.openxmlformats.org/drawingml/2006/main" xmlns:r="http://schemas.openxmlformats.org/officeDocument/2006/relationships" xmlns:p="http://schemas.openxmlformats.org/presentationml/2006/main">
   <p:cSld>
@@ -9279,24 +9279,14 @@
           <a:p>
             <a:r>
               <a:rPr lang="pt-BR" sz="2800" dirty="0" smtClean="0"/>
-              <a:t>Movimentou cerca de 1,23 trilhões de dólares em </a:t>
-            </a:r>
+              <a:t>Movimentou cerca de 1,23 trilhões de dólares em 2008 (SUCESU-RS, 2011).</a:t>
+            </a:r>
+          </a:p>
+          <a:p>
             <a:r>
               <a:rPr lang="pt-BR" sz="2800" dirty="0" smtClean="0"/>
-              <a:t>2008 (SUCESU-RS, 2011).</a:t>
-            </a:r>
-            <a:endParaRPr lang="pt-BR" sz="2800" dirty="0" smtClean="0"/>
-          </a:p>
-          <a:p>
-            <a:r>
-              <a:rPr lang="pt-BR" sz="2800" dirty="0" smtClean="0"/>
-              <a:t>Possui um crescimento de 3% ao </a:t>
-            </a:r>
-            <a:r>
-              <a:rPr lang="pt-BR" sz="2800" dirty="0" smtClean="0"/>
-              <a:t>ano.</a:t>
-            </a:r>
-            <a:endParaRPr lang="pt-BR" sz="2800" dirty="0" smtClean="0"/>
+              <a:t>Possui um crescimento de 3% ao ano.</a:t>
+            </a:r>
           </a:p>
           <a:p>
             <a:r>
@@ -9859,96 +9849,6 @@
       </p:cxnSp>
       <p:sp>
         <p:nvSpPr>
-          <p:cNvPr id="15" name="TextBox 14"/>
-          <p:cNvSpPr txBox="1"/>
-          <p:nvPr/>
-        </p:nvSpPr>
-        <p:spPr>
-          <a:xfrm>
-            <a:off x="1528359" y="3910773"/>
-            <a:ext cx="877276" cy="369332"/>
-          </a:xfrm>
-          <a:prstGeom prst="rect">
-            <a:avLst/>
-          </a:prstGeom>
-          <a:noFill/>
-        </p:spPr>
-        <p:txBody>
-          <a:bodyPr wrap="none" rtlCol="0">
-            <a:spAutoFit/>
-          </a:bodyPr>
-          <a:lstStyle/>
-          <a:p>
-            <a:r>
-              <a:rPr lang="pt-BR" dirty="0" smtClean="0"/>
-              <a:t>Resulta</a:t>
-            </a:r>
-            <a:endParaRPr lang="pt-BR" dirty="0"/>
-          </a:p>
-        </p:txBody>
-      </p:sp>
-      <p:sp>
-        <p:nvSpPr>
-          <p:cNvPr id="17" name="TextBox 16"/>
-          <p:cNvSpPr txBox="1"/>
-          <p:nvPr/>
-        </p:nvSpPr>
-        <p:spPr>
-          <a:xfrm>
-            <a:off x="4057130" y="5169445"/>
-            <a:ext cx="740445" cy="369332"/>
-          </a:xfrm>
-          <a:prstGeom prst="rect">
-            <a:avLst/>
-          </a:prstGeom>
-          <a:noFill/>
-        </p:spPr>
-        <p:txBody>
-          <a:bodyPr wrap="none" rtlCol="0">
-            <a:spAutoFit/>
-          </a:bodyPr>
-          <a:lstStyle/>
-          <a:p>
-            <a:r>
-              <a:rPr lang="pt-BR" dirty="0" smtClean="0"/>
-              <a:t>Causa</a:t>
-            </a:r>
-            <a:endParaRPr lang="pt-BR" dirty="0"/>
-          </a:p>
-        </p:txBody>
-      </p:sp>
-      <p:sp>
-        <p:nvSpPr>
-          <p:cNvPr id="18" name="TextBox 17"/>
-          <p:cNvSpPr txBox="1"/>
-          <p:nvPr/>
-        </p:nvSpPr>
-        <p:spPr>
-          <a:xfrm>
-            <a:off x="7809524" y="3693841"/>
-            <a:ext cx="877276" cy="369332"/>
-          </a:xfrm>
-          <a:prstGeom prst="rect">
-            <a:avLst/>
-          </a:prstGeom>
-          <a:noFill/>
-        </p:spPr>
-        <p:txBody>
-          <a:bodyPr wrap="none" rtlCol="0">
-            <a:spAutoFit/>
-          </a:bodyPr>
-          <a:lstStyle/>
-          <a:p>
-            <a:r>
-              <a:rPr lang="pt-BR" dirty="0" smtClean="0"/>
-              <a:t>Resulta</a:t>
-            </a:r>
-            <a:endParaRPr lang="pt-BR" dirty="0"/>
-          </a:p>
-        </p:txBody>
-      </p:sp>
-      <p:sp>
-        <p:nvSpPr>
           <p:cNvPr id="16" name="Rounded Rectangle 15"/>
           <p:cNvSpPr/>
           <p:nvPr/>
@@ -10169,7 +10069,15 @@
             </a:r>
             <a:r>
               <a:rPr lang="it-IT" dirty="0" smtClean="0"/>
-              <a:t> era </a:t>
+              <a:t> </a:t>
+            </a:r>
+            <a:r>
+              <a:rPr lang="fr-FR" smtClean="0"/>
+              <a:t>é</a:t>
+            </a:r>
+            <a:r>
+              <a:rPr lang="it-IT" smtClean="0"/>
+              <a:t> </a:t>
             </a:r>
             <a:r>
               <a:rPr lang="it-IT" dirty="0" err="1" smtClean="0"/>
@@ -10826,18 +10734,6 @@
             </a:r>
           </a:p>
           <a:p>
-            <a:r>
-              <a:rPr lang="pt-BR" dirty="0" smtClean="0"/>
-              <a:t>Facilita a </a:t>
-            </a:r>
-            <a:r>
-              <a:rPr lang="pt-BR" dirty="0"/>
-              <a:t>e</a:t>
-            </a:r>
-            <a:r>
-              <a:rPr lang="pt-BR" dirty="0" smtClean="0"/>
-              <a:t>xecução de todos os testes criados.</a:t>
-            </a:r>
             <a:endParaRPr lang="pt-BR" dirty="0"/>
           </a:p>
         </p:txBody>

</xml_diff>